<commit_message>
Update Presentation - Project 01.pptx
</commit_message>
<xml_diff>
--- a/Presentation - Project 01.pptx
+++ b/Presentation - Project 01.pptx
@@ -2517,9 +2517,9 @@
     <dgm:cxn modelId="{5456D21B-0EB1-4E81-9DFE-37B7C635F0A0}" type="presOf" srcId="{17DC462F-E382-45B9-AB28-C2E126247CC9}" destId="{2012901E-CFE7-452F-B45D-F5FD55F43CCE}" srcOrd="0" destOrd="0" presId="urn:microsoft.com/office/officeart/2005/8/layout/bProcess4"/>
     <dgm:cxn modelId="{03B5B231-9FB3-4534-A424-57434CDA1277}" type="presOf" srcId="{4ED725CC-EFCA-43D3-A941-1B654FA791FA}" destId="{72BB134C-623B-43AB-B4EA-D0A71D905399}" srcOrd="0" destOrd="0" presId="urn:microsoft.com/office/officeart/2005/8/layout/bProcess4"/>
     <dgm:cxn modelId="{61CEA436-352B-448F-BE01-00EA66F82C6D}" srcId="{5B741EE2-5C14-4B65-A743-40EBC361C716}" destId="{17DC462F-E382-45B9-AB28-C2E126247CC9}" srcOrd="1" destOrd="0" parTransId="{2D98CFB2-69FC-442F-8981-48CB272691DE}" sibTransId="{820E4FE6-223E-4DC3-B335-C17C911E6CF4}"/>
+    <dgm:cxn modelId="{CCF4E157-364B-4088-90EA-201CD203F28E}" type="presOf" srcId="{75CFB05E-E763-43CA-BEE5-B28614FBD6C7}" destId="{0062D96B-76B9-43C3-968F-2370782DCBB2}" srcOrd="0" destOrd="0" presId="urn:microsoft.com/office/officeart/2005/8/layout/bProcess4"/>
     <dgm:cxn modelId="{2189E562-85CD-42D7-BCFB-6C101EFB0271}" type="presOf" srcId="{516B3ADD-3339-4083-AAA5-2194E59E05E3}" destId="{D481F940-4BF3-4BE4-BBA8-C77B14055CD1}" srcOrd="0" destOrd="0" presId="urn:microsoft.com/office/officeart/2005/8/layout/bProcess4"/>
     <dgm:cxn modelId="{AB8A146B-9C15-4A20-B66F-520A0836A9D7}" type="presOf" srcId="{34E981D1-F80D-416F-96A1-EB53D27D31C0}" destId="{EE333210-795F-4AE4-8AFE-80A8156BAF49}" srcOrd="0" destOrd="0" presId="urn:microsoft.com/office/officeart/2005/8/layout/bProcess4"/>
-    <dgm:cxn modelId="{CCF4E157-364B-4088-90EA-201CD203F28E}" type="presOf" srcId="{75CFB05E-E763-43CA-BEE5-B28614FBD6C7}" destId="{0062D96B-76B9-43C3-968F-2370782DCBB2}" srcOrd="0" destOrd="0" presId="urn:microsoft.com/office/officeart/2005/8/layout/bProcess4"/>
     <dgm:cxn modelId="{8702E584-9B4B-4726-9DF2-C08A1AA19902}" srcId="{5B741EE2-5C14-4B65-A743-40EBC361C716}" destId="{34E981D1-F80D-416F-96A1-EB53D27D31C0}" srcOrd="0" destOrd="0" parTransId="{D3CC5232-76A0-4889-9BB0-B9F9D63C86C4}" sibTransId="{4ED725CC-EFCA-43D3-A941-1B654FA791FA}"/>
     <dgm:cxn modelId="{253F1188-F21F-40AE-92CB-F3D9F3653644}" srcId="{5B741EE2-5C14-4B65-A743-40EBC361C716}" destId="{75CFB05E-E763-43CA-BEE5-B28614FBD6C7}" srcOrd="4" destOrd="0" parTransId="{9D646A05-986D-4DB5-8EB9-2CD1173C1C08}" sibTransId="{BC0387C9-B3C2-440E-8F0D-8759924BCA1B}"/>
     <dgm:cxn modelId="{924A7E9F-6EEE-494C-8E5C-5AA50028CDE2}" srcId="{5B741EE2-5C14-4B65-A743-40EBC361C716}" destId="{94320C24-6ABF-4C0C-B0ED-EB2460597589}" srcOrd="3" destOrd="0" parTransId="{D6110652-5477-4937-9B32-97A9EE672061}" sibTransId="{146D77CE-0DC1-4827-B3D3-FC94E8209EFB}"/>
@@ -6805,7 +6805,7 @@
           <a:p>
             <a:fld id="{BA427AEC-7B6F-452C-B68A-83FDEBC4E740}" type="datetimeFigureOut">
               <a:rPr lang="en-CA" smtClean="0"/>
-              <a:t>2020-07-04</a:t>
+              <a:t>2020-07-05</a:t>
             </a:fld>
             <a:endParaRPr lang="en-CA"/>
           </a:p>
@@ -10076,7 +10076,7 @@
           <a:p>
             <a:fld id="{78C8E417-D454-46EA-9245-2C4A0C1023CE}" type="datetimeFigureOut">
               <a:rPr lang="en-CA" smtClean="0"/>
-              <a:t>2020-07-04</a:t>
+              <a:t>2020-07-05</a:t>
             </a:fld>
             <a:endParaRPr lang="en-CA"/>
           </a:p>
@@ -10276,7 +10276,7 @@
           <a:p>
             <a:fld id="{78C8E417-D454-46EA-9245-2C4A0C1023CE}" type="datetimeFigureOut">
               <a:rPr lang="en-CA" smtClean="0"/>
-              <a:t>2020-07-04</a:t>
+              <a:t>2020-07-05</a:t>
             </a:fld>
             <a:endParaRPr lang="en-CA"/>
           </a:p>
@@ -10486,7 +10486,7 @@
           <a:p>
             <a:fld id="{78C8E417-D454-46EA-9245-2C4A0C1023CE}" type="datetimeFigureOut">
               <a:rPr lang="en-CA" smtClean="0"/>
-              <a:t>2020-07-04</a:t>
+              <a:t>2020-07-05</a:t>
             </a:fld>
             <a:endParaRPr lang="en-CA"/>
           </a:p>
@@ -10686,7 +10686,7 @@
           <a:p>
             <a:fld id="{78C8E417-D454-46EA-9245-2C4A0C1023CE}" type="datetimeFigureOut">
               <a:rPr lang="en-CA" smtClean="0"/>
-              <a:t>2020-07-04</a:t>
+              <a:t>2020-07-05</a:t>
             </a:fld>
             <a:endParaRPr lang="en-CA"/>
           </a:p>
@@ -10962,7 +10962,7 @@
           <a:p>
             <a:fld id="{78C8E417-D454-46EA-9245-2C4A0C1023CE}" type="datetimeFigureOut">
               <a:rPr lang="en-CA" smtClean="0"/>
-              <a:t>2020-07-04</a:t>
+              <a:t>2020-07-05</a:t>
             </a:fld>
             <a:endParaRPr lang="en-CA"/>
           </a:p>
@@ -11230,7 +11230,7 @@
           <a:p>
             <a:fld id="{78C8E417-D454-46EA-9245-2C4A0C1023CE}" type="datetimeFigureOut">
               <a:rPr lang="en-CA" smtClean="0"/>
-              <a:t>2020-07-04</a:t>
+              <a:t>2020-07-05</a:t>
             </a:fld>
             <a:endParaRPr lang="en-CA"/>
           </a:p>
@@ -11645,7 +11645,7 @@
           <a:p>
             <a:fld id="{78C8E417-D454-46EA-9245-2C4A0C1023CE}" type="datetimeFigureOut">
               <a:rPr lang="en-CA" smtClean="0"/>
-              <a:t>2020-07-04</a:t>
+              <a:t>2020-07-05</a:t>
             </a:fld>
             <a:endParaRPr lang="en-CA"/>
           </a:p>
@@ -11787,7 +11787,7 @@
           <a:p>
             <a:fld id="{78C8E417-D454-46EA-9245-2C4A0C1023CE}" type="datetimeFigureOut">
               <a:rPr lang="en-CA" smtClean="0"/>
-              <a:t>2020-07-04</a:t>
+              <a:t>2020-07-05</a:t>
             </a:fld>
             <a:endParaRPr lang="en-CA"/>
           </a:p>
@@ -11900,7 +11900,7 @@
           <a:p>
             <a:fld id="{78C8E417-D454-46EA-9245-2C4A0C1023CE}" type="datetimeFigureOut">
               <a:rPr lang="en-CA" smtClean="0"/>
-              <a:t>2020-07-04</a:t>
+              <a:t>2020-07-05</a:t>
             </a:fld>
             <a:endParaRPr lang="en-CA"/>
           </a:p>
@@ -12213,7 +12213,7 @@
           <a:p>
             <a:fld id="{78C8E417-D454-46EA-9245-2C4A0C1023CE}" type="datetimeFigureOut">
               <a:rPr lang="en-CA" smtClean="0"/>
-              <a:t>2020-07-04</a:t>
+              <a:t>2020-07-05</a:t>
             </a:fld>
             <a:endParaRPr lang="en-CA"/>
           </a:p>
@@ -12502,7 +12502,7 @@
           <a:p>
             <a:fld id="{78C8E417-D454-46EA-9245-2C4A0C1023CE}" type="datetimeFigureOut">
               <a:rPr lang="en-CA" smtClean="0"/>
-              <a:t>2020-07-04</a:t>
+              <a:t>2020-07-05</a:t>
             </a:fld>
             <a:endParaRPr lang="en-CA"/>
           </a:p>
@@ -12745,7 +12745,7 @@
           <a:p>
             <a:fld id="{78C8E417-D454-46EA-9245-2C4A0C1023CE}" type="datetimeFigureOut">
               <a:rPr lang="en-CA" smtClean="0"/>
-              <a:t>2020-07-04</a:t>
+              <a:t>2020-07-05</a:t>
             </a:fld>
             <a:endParaRPr lang="en-CA"/>
           </a:p>
@@ -14018,7 +14018,7 @@
         <p:spPr>
           <a:xfrm>
             <a:off x="20" y="10"/>
-            <a:ext cx="12191980" cy="6857990"/>
+            <a:ext cx="12100936" cy="6857990"/>
           </a:xfrm>
           <a:prstGeom prst="rect">
             <a:avLst/>
@@ -14146,8 +14146,8 @@
         </p:blipFill>
         <p:spPr>
           <a:xfrm>
-            <a:off x="20" y="10"/>
-            <a:ext cx="12191980" cy="6857990"/>
+            <a:off x="106878" y="10"/>
+            <a:ext cx="11994078" cy="6857990"/>
           </a:xfrm>
           <a:prstGeom prst="rect">
             <a:avLst/>
@@ -14172,8 +14172,8 @@
         </p:nvSpPr>
         <p:spPr>
           <a:xfrm>
-            <a:off x="7524520" y="4698467"/>
-            <a:ext cx="4667460" cy="2159533"/>
+            <a:off x="7619523" y="4627215"/>
+            <a:ext cx="4350805" cy="1975465"/>
           </a:xfrm>
           <a:prstGeom prst="ellipse">
             <a:avLst/>
@@ -14195,14 +14195,14 @@
           <a:p>
             <a:pPr algn="ctr"/>
             <a:r>
-              <a:rPr lang="en-US" sz="4000" b="1" dirty="0">
+              <a:rPr lang="en-US" sz="3200" b="1" dirty="0">
                 <a:solidFill>
                   <a:srgbClr val="262626"/>
                 </a:solidFill>
               </a:rPr>
               <a:t>Neighborhood Investigation</a:t>
             </a:r>
-            <a:endParaRPr lang="en-US" sz="2200" dirty="0">
+            <a:endParaRPr lang="en-US" sz="3200" dirty="0">
               <a:solidFill>
                 <a:srgbClr val="262626"/>
               </a:solidFill>

</xml_diff>